<commit_message>
added feature term in ppt
</commit_message>
<xml_diff>
--- a/Introduction to Machine Learning.pptx
+++ b/Introduction to Machine Learning.pptx
@@ -289,18 +289,18 @@
   <pc:docChgLst>
     <pc:chgData name="Shaktisinh Bhati (LCL)" userId="e6798e84-f98b-4a56-9bbe-908e7ef638d6" providerId="ADAL" clId="{83DE3159-016C-4230-A12E-0F8F0FB8661E}"/>
     <pc:docChg chg="custSel addSld delSld modSld">
-      <pc:chgData name="Shaktisinh Bhati (LCL)" userId="e6798e84-f98b-4a56-9bbe-908e7ef638d6" providerId="ADAL" clId="{83DE3159-016C-4230-A12E-0F8F0FB8661E}" dt="2020-11-23T03:39:07.995" v="1695" actId="20577"/>
+      <pc:chgData name="Shaktisinh Bhati (LCL)" userId="e6798e84-f98b-4a56-9bbe-908e7ef638d6" providerId="ADAL" clId="{83DE3159-016C-4230-A12E-0F8F0FB8661E}" dt="2020-12-06T00:36:31.508" v="2132" actId="20577"/>
       <pc:docMkLst>
         <pc:docMk/>
       </pc:docMkLst>
       <pc:sldChg chg="modSp">
-        <pc:chgData name="Shaktisinh Bhati (LCL)" userId="e6798e84-f98b-4a56-9bbe-908e7ef638d6" providerId="ADAL" clId="{83DE3159-016C-4230-A12E-0F8F0FB8661E}" dt="2020-11-23T01:55:01.501" v="24" actId="20577"/>
+        <pc:chgData name="Shaktisinh Bhati (LCL)" userId="e6798e84-f98b-4a56-9bbe-908e7ef638d6" providerId="ADAL" clId="{83DE3159-016C-4230-A12E-0F8F0FB8661E}" dt="2020-12-06T00:28:00.898" v="1704" actId="20577"/>
         <pc:sldMkLst>
           <pc:docMk/>
           <pc:sldMk cId="0" sldId="256"/>
         </pc:sldMkLst>
         <pc:spChg chg="mod">
-          <ac:chgData name="Shaktisinh Bhati (LCL)" userId="e6798e84-f98b-4a56-9bbe-908e7ef638d6" providerId="ADAL" clId="{83DE3159-016C-4230-A12E-0F8F0FB8661E}" dt="2020-11-23T01:55:01.501" v="24" actId="20577"/>
+          <ac:chgData name="Shaktisinh Bhati (LCL)" userId="e6798e84-f98b-4a56-9bbe-908e7ef638d6" providerId="ADAL" clId="{83DE3159-016C-4230-A12E-0F8F0FB8661E}" dt="2020-12-06T00:28:00.898" v="1704" actId="20577"/>
           <ac:spMkLst>
             <pc:docMk/>
             <pc:sldMk cId="0" sldId="256"/>
@@ -324,7 +324,7 @@
         </pc:spChg>
       </pc:sldChg>
       <pc:sldChg chg="modSp">
-        <pc:chgData name="Shaktisinh Bhati (LCL)" userId="e6798e84-f98b-4a56-9bbe-908e7ef638d6" providerId="ADAL" clId="{83DE3159-016C-4230-A12E-0F8F0FB8661E}" dt="2020-11-23T03:39:07.995" v="1695" actId="20577"/>
+        <pc:chgData name="Shaktisinh Bhati (LCL)" userId="e6798e84-f98b-4a56-9bbe-908e7ef638d6" providerId="ADAL" clId="{83DE3159-016C-4230-A12E-0F8F0FB8661E}" dt="2020-12-06T00:36:31.508" v="2132" actId="20577"/>
         <pc:sldMkLst>
           <pc:docMk/>
           <pc:sldMk cId="0" sldId="261"/>
@@ -338,7 +338,7 @@
           </ac:spMkLst>
         </pc:spChg>
         <pc:spChg chg="mod">
-          <ac:chgData name="Shaktisinh Bhati (LCL)" userId="e6798e84-f98b-4a56-9bbe-908e7ef638d6" providerId="ADAL" clId="{83DE3159-016C-4230-A12E-0F8F0FB8661E}" dt="2020-11-23T03:39:07.995" v="1695" actId="20577"/>
+          <ac:chgData name="Shaktisinh Bhati (LCL)" userId="e6798e84-f98b-4a56-9bbe-908e7ef638d6" providerId="ADAL" clId="{83DE3159-016C-4230-A12E-0F8F0FB8661E}" dt="2020-12-06T00:36:31.508" v="2132" actId="20577"/>
           <ac:spMkLst>
             <pc:docMk/>
             <pc:sldMk cId="0" sldId="261"/>
@@ -6774,7 +6774,7 @@
             </a:r>
             <a:r>
               <a:rPr lang="en-US" sz="3600" dirty="0"/>
-              <a:t>n: Machine Learning</a:t>
+              <a:t>n: Intro to Machine Learning</a:t>
             </a:r>
             <a:endParaRPr sz="3600" dirty="0"/>
           </a:p>
@@ -7339,7 +7339,7 @@
               <a:buChar char="●"/>
             </a:pPr>
             <a:r>
-              <a:rPr lang="en-US" sz="2400" dirty="0"/>
+              <a:rPr lang="en-US" sz="1500" dirty="0"/>
               <a:t>ML Algorithms</a:t>
             </a:r>
           </a:p>
@@ -7352,7 +7352,7 @@
               <a:buChar char="●"/>
             </a:pPr>
             <a:r>
-              <a:rPr lang="en-US" sz="2000" dirty="0"/>
+              <a:rPr lang="en-US" sz="1500" dirty="0"/>
               <a:t>An algorithm is simply a set of procedures that are followed to perform a task</a:t>
             </a:r>
           </a:p>
@@ -7365,10 +7365,10 @@
               <a:buChar char="●"/>
             </a:pPr>
             <a:r>
-              <a:rPr lang="en-US" sz="2000" dirty="0"/>
+              <a:rPr lang="en-US" sz="1500" dirty="0"/>
               <a:t>Examples: Linear Regression, Decision Tree, K-means, Random Forest</a:t>
             </a:r>
-            <a:endParaRPr lang="en" sz="1600" dirty="0"/>
+            <a:endParaRPr lang="en" sz="1500" dirty="0"/>
           </a:p>
           <a:p>
             <a:pPr marL="457200" marR="0" lvl="0" indent="-342900" algn="l" rtl="0">
@@ -7385,10 +7385,10 @@
               <a:buChar char="●"/>
             </a:pPr>
             <a:r>
-              <a:rPr lang="en" sz="2400" dirty="0"/>
+              <a:rPr lang="en" sz="1500" dirty="0"/>
               <a:t>Training &amp; Test Sets</a:t>
             </a:r>
-            <a:endParaRPr sz="2400" dirty="0"/>
+            <a:endParaRPr sz="1500" dirty="0"/>
           </a:p>
           <a:p>
             <a:pPr marL="914400" marR="0" lvl="1" indent="-317500" algn="l" rtl="0">
@@ -7405,10 +7405,10 @@
               <a:buChar char="○"/>
             </a:pPr>
             <a:r>
-              <a:rPr lang="en" sz="2000" dirty="0"/>
+              <a:rPr lang="en" sz="1500" dirty="0"/>
               <a:t>Training Set</a:t>
             </a:r>
-            <a:endParaRPr sz="2000" dirty="0"/>
+            <a:endParaRPr sz="1500" dirty="0"/>
           </a:p>
           <a:p>
             <a:pPr marL="1371600" marR="0" lvl="2" indent="-317500" algn="l" rtl="0">
@@ -7425,11 +7425,11 @@
               <a:buChar char="■"/>
             </a:pPr>
             <a:r>
-              <a:rPr lang="en" sz="2000" dirty="0"/>
+              <a:rPr lang="en" sz="1500" dirty="0"/>
               <a:t>Fed to our model to learn the relationship between the features </a:t>
             </a:r>
             <a:r>
-              <a:rPr lang="en-US" sz="2000" dirty="0"/>
+              <a:rPr lang="en-US" sz="1500" dirty="0"/>
               <a:t>and the target label</a:t>
             </a:r>
           </a:p>
@@ -7448,7 +7448,7 @@
               <a:buChar char="○"/>
             </a:pPr>
             <a:r>
-              <a:rPr lang="en-US" sz="2000" dirty="0"/>
+              <a:rPr lang="en-US" sz="1500" dirty="0"/>
               <a:t>Test Set</a:t>
             </a:r>
           </a:p>
@@ -7467,14 +7467,54 @@
               <a:buChar char="■"/>
             </a:pPr>
             <a:r>
-              <a:rPr lang="en-US" sz="2000" dirty="0"/>
+              <a:rPr lang="en-US" sz="1500" dirty="0"/>
               <a:t>Test our model on data </a:t>
             </a:r>
             <a:r>
-              <a:rPr lang="en" sz="2000" dirty="0"/>
-              <a:t> is robust and not overfit. </a:t>
+              <a:rPr lang="en" sz="1500" dirty="0"/>
+              <a:t> is robust and not overfit.</a:t>
             </a:r>
-            <a:endParaRPr sz="2000" dirty="0"/>
+          </a:p>
+          <a:p>
+            <a:pPr>
+              <a:buChar char="■"/>
+            </a:pPr>
+            <a:r>
+              <a:rPr lang="en" sz="1500" dirty="0"/>
+              <a:t>Feature</a:t>
+            </a:r>
+            <a:r>
+              <a:rPr lang="en-US" sz="1500" dirty="0"/>
+              <a:t>s</a:t>
+            </a:r>
+            <a:endParaRPr lang="en" sz="1500" dirty="0"/>
+          </a:p>
+          <a:p>
+            <a:pPr lvl="1">
+              <a:buChar char="■"/>
+            </a:pPr>
+            <a:r>
+              <a:rPr lang="en-US" sz="1500" dirty="0"/>
+              <a:t>D</a:t>
+            </a:r>
+            <a:r>
+              <a:rPr lang="en" sz="1500" dirty="0"/>
+              <a:t>ata ‘</a:t>
+            </a:r>
+            <a:r>
+              <a:rPr lang="en-US" sz="1500" dirty="0"/>
+              <a:t>characteristics’ that act as inputs to model. That information is used by the model to make prediction. The better features you choose, the better your model will perform </a:t>
+            </a:r>
+          </a:p>
+          <a:p>
+            <a:pPr lvl="1">
+              <a:buChar char="■"/>
+            </a:pPr>
+            <a:r>
+              <a:rPr lang="en-US" sz="1500" dirty="0"/>
+              <a:t>More features does not always equal better model</a:t>
+            </a:r>
+            <a:endParaRPr lang="en" sz="1500" dirty="0"/>
           </a:p>
         </p:txBody>
       </p:sp>

</xml_diff>